<commit_message>
Created CustomControls with Peers created for each of them.
git-svn-id: https://white-project.googlecode.com/svn/trunk@72 ecd27aaf-8644-0410-a1a0-1db6a312f109
</commit_message>
<xml_diff>
--- a/docs/images/Diagrams.pptx
+++ b/docs/images/Diagrams.pptx
@@ -197,7 +197,7 @@
             <a:fld id="{81C2C3CD-16E3-42AA-ABCD-CA0CA08557DE}" type="datetimeFigureOut">
               <a:rPr lang="en-US" smtClean="0"/>
               <a:pPr/>
-              <a:t>27-Apr-10</a:t>
+              <a:t>07-May-10</a:t>
             </a:fld>
             <a:endParaRPr lang="en-US"/>
           </a:p>
@@ -806,7 +806,6 @@
               <a:rPr lang="en-US" baseline="0" dirty="0" smtClean="0"/>
               <a:t> class relationship</a:t>
             </a:r>
-            <a:endParaRPr lang="en-US" baseline="0" dirty="0" smtClean="0"/>
           </a:p>
         </p:txBody>
       </p:sp>
@@ -890,11 +889,7 @@
           <a:p>
             <a:r>
               <a:rPr lang="en-US" baseline="0" dirty="0" smtClean="0"/>
-              <a:t>How custom commands work</a:t>
-            </a:r>
-            <a:r>
-              <a:rPr lang="en-US" baseline="0" dirty="0" smtClean="0"/>
-              <a:t>?</a:t>
+              <a:t>How custom commands work?</a:t>
             </a:r>
           </a:p>
           <a:p>
@@ -1144,7 +1139,7 @@
             <a:fld id="{6D492906-AEFE-4E4A-90D4-FBAB3ABE0DE9}" type="datetimeFigureOut">
               <a:rPr lang="en-US" smtClean="0"/>
               <a:pPr/>
-              <a:t>27-Apr-10</a:t>
+              <a:t>07-May-10</a:t>
             </a:fld>
             <a:endParaRPr lang="en-US"/>
           </a:p>
@@ -1311,7 +1306,7 @@
             <a:fld id="{6D492906-AEFE-4E4A-90D4-FBAB3ABE0DE9}" type="datetimeFigureOut">
               <a:rPr lang="en-US" smtClean="0"/>
               <a:pPr/>
-              <a:t>27-Apr-10</a:t>
+              <a:t>07-May-10</a:t>
             </a:fld>
             <a:endParaRPr lang="en-US"/>
           </a:p>
@@ -1488,7 +1483,7 @@
             <a:fld id="{6D492906-AEFE-4E4A-90D4-FBAB3ABE0DE9}" type="datetimeFigureOut">
               <a:rPr lang="en-US" smtClean="0"/>
               <a:pPr/>
-              <a:t>27-Apr-10</a:t>
+              <a:t>07-May-10</a:t>
             </a:fld>
             <a:endParaRPr lang="en-US"/>
           </a:p>
@@ -1655,7 +1650,7 @@
             <a:fld id="{6D492906-AEFE-4E4A-90D4-FBAB3ABE0DE9}" type="datetimeFigureOut">
               <a:rPr lang="en-US" smtClean="0"/>
               <a:pPr/>
-              <a:t>27-Apr-10</a:t>
+              <a:t>07-May-10</a:t>
             </a:fld>
             <a:endParaRPr lang="en-US"/>
           </a:p>
@@ -1898,7 +1893,7 @@
             <a:fld id="{6D492906-AEFE-4E4A-90D4-FBAB3ABE0DE9}" type="datetimeFigureOut">
               <a:rPr lang="en-US" smtClean="0"/>
               <a:pPr/>
-              <a:t>27-Apr-10</a:t>
+              <a:t>07-May-10</a:t>
             </a:fld>
             <a:endParaRPr lang="en-US"/>
           </a:p>
@@ -2183,7 +2178,7 @@
             <a:fld id="{6D492906-AEFE-4E4A-90D4-FBAB3ABE0DE9}" type="datetimeFigureOut">
               <a:rPr lang="en-US" smtClean="0"/>
               <a:pPr/>
-              <a:t>27-Apr-10</a:t>
+              <a:t>07-May-10</a:t>
             </a:fld>
             <a:endParaRPr lang="en-US"/>
           </a:p>
@@ -2602,7 +2597,7 @@
             <a:fld id="{6D492906-AEFE-4E4A-90D4-FBAB3ABE0DE9}" type="datetimeFigureOut">
               <a:rPr lang="en-US" smtClean="0"/>
               <a:pPr/>
-              <a:t>27-Apr-10</a:t>
+              <a:t>07-May-10</a:t>
             </a:fld>
             <a:endParaRPr lang="en-US"/>
           </a:p>
@@ -2717,7 +2712,7 @@
             <a:fld id="{6D492906-AEFE-4E4A-90D4-FBAB3ABE0DE9}" type="datetimeFigureOut">
               <a:rPr lang="en-US" smtClean="0"/>
               <a:pPr/>
-              <a:t>27-Apr-10</a:t>
+              <a:t>07-May-10</a:t>
             </a:fld>
             <a:endParaRPr lang="en-US"/>
           </a:p>
@@ -2809,7 +2804,7 @@
             <a:fld id="{6D492906-AEFE-4E4A-90D4-FBAB3ABE0DE9}" type="datetimeFigureOut">
               <a:rPr lang="en-US" smtClean="0"/>
               <a:pPr/>
-              <a:t>27-Apr-10</a:t>
+              <a:t>07-May-10</a:t>
             </a:fld>
             <a:endParaRPr lang="en-US"/>
           </a:p>
@@ -3083,7 +3078,7 @@
             <a:fld id="{6D492906-AEFE-4E4A-90D4-FBAB3ABE0DE9}" type="datetimeFigureOut">
               <a:rPr lang="en-US" smtClean="0"/>
               <a:pPr/>
-              <a:t>27-Apr-10</a:t>
+              <a:t>07-May-10</a:t>
             </a:fld>
             <a:endParaRPr lang="en-US"/>
           </a:p>
@@ -3333,7 +3328,7 @@
             <a:fld id="{6D492906-AEFE-4E4A-90D4-FBAB3ABE0DE9}" type="datetimeFigureOut">
               <a:rPr lang="en-US" smtClean="0"/>
               <a:pPr/>
-              <a:t>27-Apr-10</a:t>
+              <a:t>07-May-10</a:t>
             </a:fld>
             <a:endParaRPr lang="en-US"/>
           </a:p>
@@ -3543,7 +3538,7 @@
             <a:fld id="{6D492906-AEFE-4E4A-90D4-FBAB3ABE0DE9}" type="datetimeFigureOut">
               <a:rPr lang="en-US" smtClean="0"/>
               <a:pPr/>
-              <a:t>27-Apr-10</a:t>
+              <a:t>07-May-10</a:t>
             </a:fld>
             <a:endParaRPr lang="en-US"/>
           </a:p>
@@ -6965,20 +6960,20 @@
       </p:grpSpPr>
       <p:sp>
         <p:nvSpPr>
-          <p:cNvPr id="12" name="Rounded Rectangle 11"/>
+          <p:cNvPr id="17" name="Rectangle 16"/>
           <p:cNvSpPr/>
           <p:nvPr/>
         </p:nvSpPr>
         <p:spPr>
           <a:xfrm>
-            <a:off x="641130" y="1981200"/>
-            <a:ext cx="1371600" cy="914400"/>
-          </a:xfrm>
-          <a:prstGeom prst="roundRect">
+            <a:off x="533400" y="1676400"/>
+            <a:ext cx="8229600" cy="3505200"/>
+          </a:xfrm>
+          <a:prstGeom prst="rect">
             <a:avLst/>
           </a:prstGeom>
           <a:solidFill>
-            <a:schemeClr val="tx1"/>
+            <a:schemeClr val="bg1"/>
           </a:solidFill>
         </p:spPr>
         <p:style>
@@ -7001,31 +6996,123 @@
           <a:bodyPr rtlCol="0" anchor="ctr"/>
           <a:lstStyle/>
           <a:p>
-            <a:pPr algn="ctr"/>
-            <a:r>
-              <a:rPr lang="en-US" dirty="0" err="1" smtClean="0"/>
-              <a:t>ComboBox</a:t>
-            </a:r>
-            <a:endParaRPr lang="en-US" dirty="0"/>
-          </a:p>
-        </p:txBody>
-      </p:sp>
-      <p:sp>
-        <p:nvSpPr>
-          <p:cNvPr id="20" name="Rounded Rectangle 19"/>
+            <a:pPr algn="r"/>
+            <a:r>
+              <a:rPr lang="en-US" i="1" dirty="0" smtClean="0">
+                <a:solidFill>
+                  <a:schemeClr val="tx1"/>
+                </a:solidFill>
+              </a:rPr>
+              <a:t>With Custom Commands</a:t>
+            </a:r>
+            <a:endParaRPr lang="en-US" i="1" dirty="0" smtClean="0">
+              <a:solidFill>
+                <a:schemeClr val="tx1"/>
+              </a:solidFill>
+            </a:endParaRPr>
+          </a:p>
+          <a:p>
+            <a:pPr algn="r"/>
+            <a:endParaRPr lang="en-US" dirty="0" smtClean="0">
+              <a:solidFill>
+                <a:schemeClr val="tx1"/>
+              </a:solidFill>
+            </a:endParaRPr>
+          </a:p>
+          <a:p>
+            <a:pPr algn="r"/>
+            <a:endParaRPr lang="en-US" dirty="0" smtClean="0">
+              <a:solidFill>
+                <a:schemeClr val="tx1"/>
+              </a:solidFill>
+            </a:endParaRPr>
+          </a:p>
+          <a:p>
+            <a:pPr algn="r"/>
+            <a:endParaRPr lang="en-US" dirty="0" smtClean="0">
+              <a:solidFill>
+                <a:schemeClr val="tx1"/>
+              </a:solidFill>
+            </a:endParaRPr>
+          </a:p>
+          <a:p>
+            <a:pPr algn="r"/>
+            <a:endParaRPr lang="en-US" dirty="0" smtClean="0">
+              <a:solidFill>
+                <a:schemeClr val="tx1"/>
+              </a:solidFill>
+            </a:endParaRPr>
+          </a:p>
+          <a:p>
+            <a:pPr algn="r"/>
+            <a:endParaRPr lang="en-US" dirty="0" smtClean="0">
+              <a:solidFill>
+                <a:schemeClr val="tx1"/>
+              </a:solidFill>
+            </a:endParaRPr>
+          </a:p>
+          <a:p>
+            <a:pPr algn="r"/>
+            <a:endParaRPr lang="en-US" dirty="0" smtClean="0">
+              <a:solidFill>
+                <a:schemeClr val="tx1"/>
+              </a:solidFill>
+            </a:endParaRPr>
+          </a:p>
+          <a:p>
+            <a:pPr algn="r"/>
+            <a:endParaRPr lang="en-US" dirty="0" smtClean="0">
+              <a:solidFill>
+                <a:schemeClr val="tx1"/>
+              </a:solidFill>
+            </a:endParaRPr>
+          </a:p>
+          <a:p>
+            <a:pPr algn="ctr"/>
+            <a:endParaRPr lang="en-US" dirty="0" smtClean="0">
+              <a:solidFill>
+                <a:schemeClr val="tx1"/>
+              </a:solidFill>
+            </a:endParaRPr>
+          </a:p>
+          <a:p>
+            <a:pPr algn="ctr"/>
+            <a:endParaRPr lang="en-US" dirty="0" smtClean="0">
+              <a:solidFill>
+                <a:schemeClr val="tx1"/>
+              </a:solidFill>
+            </a:endParaRPr>
+          </a:p>
+          <a:p>
+            <a:pPr algn="ctr"/>
+            <a:endParaRPr lang="en-US" dirty="0" smtClean="0">
+              <a:solidFill>
+                <a:schemeClr val="tx1"/>
+              </a:solidFill>
+            </a:endParaRPr>
+          </a:p>
+          <a:p>
+            <a:pPr algn="ctr"/>
+            <a:endParaRPr lang="en-US" dirty="0" smtClean="0"/>
+          </a:p>
+        </p:txBody>
+      </p:sp>
+      <p:sp>
+        <p:nvSpPr>
+          <p:cNvPr id="16" name="Rectangle 15"/>
           <p:cNvSpPr/>
           <p:nvPr/>
         </p:nvSpPr>
         <p:spPr>
           <a:xfrm>
-            <a:off x="381000" y="3429000"/>
-            <a:ext cx="1905000" cy="914400"/>
-          </a:xfrm>
-          <a:prstGeom prst="roundRect">
+            <a:off x="685800" y="2228190"/>
+            <a:ext cx="5867400" cy="1524000"/>
+          </a:xfrm>
+          <a:prstGeom prst="rect">
             <a:avLst/>
           </a:prstGeom>
           <a:solidFill>
-            <a:schemeClr val="tx1"/>
+            <a:schemeClr val="bg1"/>
           </a:solidFill>
         </p:spPr>
         <p:style>
@@ -7048,32 +7135,56 @@
           <a:bodyPr rtlCol="0" anchor="ctr"/>
           <a:lstStyle/>
           <a:p>
-            <a:pPr algn="ctr"/>
-            <a:r>
-              <a:rPr lang="en-US" dirty="0" smtClean="0"/>
-              <a:t>White</a:t>
-            </a:r>
-          </a:p>
-          <a:p>
-            <a:pPr algn="ctr"/>
-            <a:r>
-              <a:rPr lang="en-US" dirty="0" err="1" smtClean="0"/>
-              <a:t>ComboBox</a:t>
-            </a:r>
-            <a:endParaRPr lang="en-US" dirty="0"/>
-          </a:p>
-        </p:txBody>
-      </p:sp>
-      <p:sp>
-        <p:nvSpPr>
-          <p:cNvPr id="21" name="Rounded Rectangle 20"/>
+            <a:pPr algn="r"/>
+            <a:r>
+              <a:rPr lang="en-US" i="1" dirty="0" smtClean="0">
+                <a:solidFill>
+                  <a:schemeClr val="tx1"/>
+                </a:solidFill>
+              </a:rPr>
+              <a:t>Without Custom Commands</a:t>
+            </a:r>
+          </a:p>
+          <a:p>
+            <a:pPr algn="ctr"/>
+            <a:endParaRPr lang="en-US" dirty="0" smtClean="0">
+              <a:solidFill>
+                <a:schemeClr val="tx1"/>
+              </a:solidFill>
+            </a:endParaRPr>
+          </a:p>
+          <a:p>
+            <a:pPr algn="ctr"/>
+            <a:endParaRPr lang="en-US" dirty="0" smtClean="0">
+              <a:solidFill>
+                <a:schemeClr val="tx1"/>
+              </a:solidFill>
+            </a:endParaRPr>
+          </a:p>
+          <a:p>
+            <a:pPr algn="ctr"/>
+            <a:endParaRPr lang="en-US" dirty="0" smtClean="0">
+              <a:solidFill>
+                <a:schemeClr val="tx1"/>
+              </a:solidFill>
+            </a:endParaRPr>
+          </a:p>
+          <a:p>
+            <a:pPr algn="ctr"/>
+            <a:endParaRPr lang="en-US" dirty="0" smtClean="0"/>
+          </a:p>
+        </p:txBody>
+      </p:sp>
+      <p:sp>
+        <p:nvSpPr>
+          <p:cNvPr id="12" name="Rounded Rectangle 11"/>
           <p:cNvSpPr/>
           <p:nvPr/>
         </p:nvSpPr>
         <p:spPr>
           <a:xfrm>
-            <a:off x="3124200" y="3429000"/>
-            <a:ext cx="2438400" cy="914400"/>
+            <a:off x="945930" y="2653860"/>
+            <a:ext cx="1371600" cy="914400"/>
           </a:xfrm>
           <a:prstGeom prst="roundRect">
             <a:avLst/>
@@ -7104,15 +7215,8 @@
           <a:p>
             <a:pPr algn="ctr"/>
             <a:r>
-              <a:rPr lang="en-US" dirty="0" smtClean="0"/>
-              <a:t>White</a:t>
-            </a:r>
-          </a:p>
-          <a:p>
-            <a:pPr algn="ctr"/>
-            <a:r>
               <a:rPr lang="en-US" dirty="0" err="1" smtClean="0"/>
-              <a:t>ComboBoxPeer</a:t>
+              <a:t>ComboBox</a:t>
             </a:r>
             <a:endParaRPr lang="en-US" dirty="0"/>
           </a:p>
@@ -7120,14 +7224,14 @@
       </p:sp>
       <p:sp>
         <p:nvSpPr>
-          <p:cNvPr id="22" name="Rounded Rectangle 21"/>
+          <p:cNvPr id="20" name="Rounded Rectangle 19"/>
           <p:cNvSpPr/>
           <p:nvPr/>
         </p:nvSpPr>
         <p:spPr>
           <a:xfrm>
-            <a:off x="2850930" y="1981200"/>
-            <a:ext cx="2971800" cy="914400"/>
+            <a:off x="685800" y="4101660"/>
+            <a:ext cx="1905000" cy="914400"/>
           </a:xfrm>
           <a:prstGeom prst="roundRect">
             <a:avLst/>
@@ -7158,31 +7262,30 @@
           <a:p>
             <a:pPr algn="ctr"/>
             <a:r>
+              <a:rPr lang="en-US" dirty="0" smtClean="0"/>
+              <a:t>White</a:t>
+            </a:r>
+          </a:p>
+          <a:p>
+            <a:pPr algn="ctr"/>
+            <a:r>
               <a:rPr lang="en-US" dirty="0" err="1" smtClean="0"/>
               <a:t>ComboBox</a:t>
             </a:r>
-            <a:endParaRPr lang="en-US" dirty="0" smtClean="0"/>
-          </a:p>
-          <a:p>
-            <a:pPr algn="ctr"/>
-            <a:r>
-              <a:rPr lang="en-US" dirty="0" err="1" smtClean="0"/>
-              <a:t>AutomationPeer</a:t>
-            </a:r>
             <a:endParaRPr lang="en-US" dirty="0"/>
           </a:p>
         </p:txBody>
       </p:sp>
       <p:sp>
         <p:nvSpPr>
-          <p:cNvPr id="24" name="Rounded Rectangle 23"/>
+          <p:cNvPr id="21" name="Rounded Rectangle 20"/>
           <p:cNvSpPr/>
           <p:nvPr/>
         </p:nvSpPr>
         <p:spPr>
           <a:xfrm>
-            <a:off x="6172200" y="3407980"/>
-            <a:ext cx="2057400" cy="914400"/>
+            <a:off x="3429000" y="4101660"/>
+            <a:ext cx="2438400" cy="914400"/>
           </a:xfrm>
           <a:prstGeom prst="roundRect">
             <a:avLst/>
@@ -7213,6 +7316,115 @@
           <a:p>
             <a:pPr algn="ctr"/>
             <a:r>
+              <a:rPr lang="en-US" dirty="0" smtClean="0"/>
+              <a:t>White</a:t>
+            </a:r>
+          </a:p>
+          <a:p>
+            <a:pPr algn="ctr"/>
+            <a:r>
+              <a:rPr lang="en-US" dirty="0" err="1" smtClean="0"/>
+              <a:t>ComboBoxPeer</a:t>
+            </a:r>
+            <a:endParaRPr lang="en-US" dirty="0"/>
+          </a:p>
+        </p:txBody>
+      </p:sp>
+      <p:sp>
+        <p:nvSpPr>
+          <p:cNvPr id="22" name="Rounded Rectangle 21"/>
+          <p:cNvSpPr/>
+          <p:nvPr/>
+        </p:nvSpPr>
+        <p:spPr>
+          <a:xfrm>
+            <a:off x="3155730" y="2653860"/>
+            <a:ext cx="2971800" cy="914400"/>
+          </a:xfrm>
+          <a:prstGeom prst="roundRect">
+            <a:avLst/>
+          </a:prstGeom>
+          <a:solidFill>
+            <a:schemeClr val="tx1"/>
+          </a:solidFill>
+        </p:spPr>
+        <p:style>
+          <a:lnRef idx="2">
+            <a:schemeClr val="accent1">
+              <a:shade val="50000"/>
+            </a:schemeClr>
+          </a:lnRef>
+          <a:fillRef idx="1">
+            <a:schemeClr val="accent1"/>
+          </a:fillRef>
+          <a:effectRef idx="0">
+            <a:schemeClr val="accent1"/>
+          </a:effectRef>
+          <a:fontRef idx="minor">
+            <a:schemeClr val="lt1"/>
+          </a:fontRef>
+        </p:style>
+        <p:txBody>
+          <a:bodyPr rtlCol="0" anchor="ctr"/>
+          <a:lstStyle/>
+          <a:p>
+            <a:pPr algn="ctr"/>
+            <a:r>
+              <a:rPr lang="en-US" dirty="0" err="1" smtClean="0"/>
+              <a:t>ComboBox</a:t>
+            </a:r>
+            <a:endParaRPr lang="en-US" dirty="0" smtClean="0"/>
+          </a:p>
+          <a:p>
+            <a:pPr algn="ctr"/>
+            <a:r>
+              <a:rPr lang="en-US" dirty="0" err="1" smtClean="0"/>
+              <a:t>AutomationPeer</a:t>
+            </a:r>
+            <a:endParaRPr lang="en-US" dirty="0"/>
+          </a:p>
+        </p:txBody>
+      </p:sp>
+      <p:sp>
+        <p:nvSpPr>
+          <p:cNvPr id="24" name="Rounded Rectangle 23"/>
+          <p:cNvSpPr/>
+          <p:nvPr/>
+        </p:nvSpPr>
+        <p:spPr>
+          <a:xfrm>
+            <a:off x="6477000" y="4080640"/>
+            <a:ext cx="2057400" cy="914400"/>
+          </a:xfrm>
+          <a:prstGeom prst="roundRect">
+            <a:avLst/>
+          </a:prstGeom>
+          <a:solidFill>
+            <a:schemeClr val="tx1"/>
+          </a:solidFill>
+        </p:spPr>
+        <p:style>
+          <a:lnRef idx="2">
+            <a:schemeClr val="accent1">
+              <a:shade val="50000"/>
+            </a:schemeClr>
+          </a:lnRef>
+          <a:fillRef idx="1">
+            <a:schemeClr val="accent1"/>
+          </a:fillRef>
+          <a:effectRef idx="0">
+            <a:schemeClr val="accent1"/>
+          </a:effectRef>
+          <a:fontRef idx="minor">
+            <a:schemeClr val="lt1"/>
+          </a:fontRef>
+        </p:style>
+        <p:txBody>
+          <a:bodyPr rtlCol="0" anchor="ctr"/>
+          <a:lstStyle/>
+          <a:p>
+            <a:pPr algn="ctr"/>
+            <a:r>
               <a:rPr lang="en-US" dirty="0" err="1" smtClean="0"/>
               <a:t>WhitePeer</a:t>
             </a:r>
@@ -7231,7 +7443,7 @@
         </p:nvCxnSpPr>
         <p:spPr>
           <a:xfrm rot="16200000" flipV="1">
-            <a:off x="1063515" y="3159015"/>
+            <a:off x="1368315" y="3831675"/>
             <a:ext cx="533400" cy="6570"/>
           </a:xfrm>
           <a:prstGeom prst="line">
@@ -7270,7 +7482,7 @@
         </p:nvCxnSpPr>
         <p:spPr>
           <a:xfrm rot="16200000" flipV="1">
-            <a:off x="4073415" y="3159015"/>
+            <a:off x="4378215" y="3831675"/>
             <a:ext cx="533400" cy="6570"/>
           </a:xfrm>
           <a:prstGeom prst="line">
@@ -7308,7 +7520,7 @@
         </p:nvCxnSpPr>
         <p:spPr>
           <a:xfrm>
-            <a:off x="2286000" y="3886200"/>
+            <a:off x="2590800" y="4558860"/>
             <a:ext cx="838200" cy="0"/>
           </a:xfrm>
           <a:prstGeom prst="line">
@@ -7344,8 +7556,46 @@
         </p:nvCxnSpPr>
         <p:spPr>
           <a:xfrm>
-            <a:off x="5562600" y="3886200"/>
+            <a:off x="5867400" y="4558860"/>
             <a:ext cx="609600" cy="0"/>
+          </a:xfrm>
+          <a:prstGeom prst="line">
+            <a:avLst/>
+          </a:prstGeom>
+          <a:ln w="44450">
+            <a:solidFill>
+              <a:schemeClr val="tx2"/>
+            </a:solidFill>
+            <a:tailEnd type="none"/>
+          </a:ln>
+        </p:spPr>
+        <p:style>
+          <a:lnRef idx="1">
+            <a:schemeClr val="accent1"/>
+          </a:lnRef>
+          <a:fillRef idx="0">
+            <a:schemeClr val="accent1"/>
+          </a:fillRef>
+          <a:effectRef idx="0">
+            <a:schemeClr val="accent1"/>
+          </a:effectRef>
+          <a:fontRef idx="minor">
+            <a:schemeClr val="tx1"/>
+          </a:fontRef>
+        </p:style>
+      </p:cxnSp>
+      <p:cxnSp>
+        <p:nvCxnSpPr>
+          <p:cNvPr id="11" name="Straight Connector 10"/>
+          <p:cNvCxnSpPr>
+            <a:endCxn id="22" idx="1"/>
+          </p:cNvCxnSpPr>
+          <p:nvPr/>
+        </p:nvCxnSpPr>
+        <p:spPr>
+          <a:xfrm>
+            <a:off x="2307020" y="3111060"/>
+            <a:ext cx="848710" cy="0"/>
           </a:xfrm>
           <a:prstGeom prst="line">
             <a:avLst/>
@@ -7618,11 +7868,7 @@
             <a:pPr algn="ctr"/>
             <a:r>
               <a:rPr lang="en-US" i="1" dirty="0" smtClean="0"/>
-              <a:t>2</a:t>
-            </a:r>
-            <a:r>
-              <a:rPr lang="en-US" i="1" dirty="0" smtClean="0"/>
-              <a:t>. Invoke </a:t>
+              <a:t>2. Invoke </a:t>
             </a:r>
           </a:p>
           <a:p>
@@ -8250,11 +8496,7 @@
             <a:pPr algn="ctr"/>
             <a:r>
               <a:rPr lang="en-US" i="1" dirty="0" smtClean="0"/>
-              <a:t>X</a:t>
-            </a:r>
-            <a:r>
-              <a:rPr lang="en-US" i="1" dirty="0" smtClean="0"/>
-              <a:t>ml Serialized</a:t>
+              <a:t>Xml Serialized</a:t>
             </a:r>
             <a:endParaRPr lang="en-US" i="1" dirty="0"/>
           </a:p>
@@ -8285,11 +8527,7 @@
             <a:pPr algn="ctr"/>
             <a:r>
               <a:rPr lang="en-US" i="1" dirty="0" smtClean="0"/>
-              <a:t>4</a:t>
-            </a:r>
-            <a:r>
-              <a:rPr lang="en-US" i="1" dirty="0" smtClean="0"/>
-              <a:t>. Cannot </a:t>
+              <a:t>4. Cannot </a:t>
             </a:r>
           </a:p>
           <a:p>
@@ -8365,11 +8603,7 @@
             <a:pPr algn="ctr"/>
             <a:r>
               <a:rPr lang="en-US" i="1" dirty="0" smtClean="0"/>
-              <a:t>7</a:t>
-            </a:r>
-            <a:r>
-              <a:rPr lang="en-US" i="1" dirty="0" smtClean="0"/>
-              <a:t>. Return </a:t>
+              <a:t>7. Return </a:t>
             </a:r>
           </a:p>
           <a:p>
@@ -8555,11 +8789,7 @@
             <a:pPr algn="ctr"/>
             <a:r>
               <a:rPr lang="en-US" i="1" dirty="0" smtClean="0"/>
-              <a:t>7</a:t>
-            </a:r>
-            <a:r>
-              <a:rPr lang="en-US" i="1" dirty="0" smtClean="0"/>
-              <a:t>. Return </a:t>
+              <a:t>7. Return </a:t>
             </a:r>
           </a:p>
           <a:p>

</xml_diff>